<commit_message>
corrected Week7 DI slides
</commit_message>
<xml_diff>
--- a/discussions/Week7/Week 7 Discussion Slides.pptx
+++ b/discussions/Week7/Week 7 Discussion Slides.pptx
@@ -18041,7 +18041,7 @@
             <a:tbl>
               <a:tblPr>
                 <a:noFill/>
-                <a:tableStyleId>{777DFC1A-FF5D-4B9F-8B83-EDFB5B2A48C6}</a:tableStyleId>
+                <a:tableStyleId>{2C6BD7FB-BC5C-4E91-A8D5-C03555700523}</a:tableStyleId>
               </a:tblPr>
               <a:tblGrid>
                 <a:gridCol w="3619500"/>
@@ -28667,7 +28667,7 @@
             <a:tbl>
               <a:tblPr>
                 <a:noFill/>
-                <a:tableStyleId>{F29DAB2E-7A2E-4B30-A63D-A3E22F2B7B69}</a:tableStyleId>
+                <a:tableStyleId>{1F3165FF-8F56-436B-82A2-12001549EA57}</a:tableStyleId>
               </a:tblPr>
               <a:tblGrid>
                 <a:gridCol w="382850"/>
@@ -30488,7 +30488,7 @@
             <a:tbl>
               <a:tblPr>
                 <a:noFill/>
-                <a:tableStyleId>{F29DAB2E-7A2E-4B30-A63D-A3E22F2B7B69}</a:tableStyleId>
+                <a:tableStyleId>{1F3165FF-8F56-436B-82A2-12001549EA57}</a:tableStyleId>
               </a:tblPr>
               <a:tblGrid>
                 <a:gridCol w="382850"/>
@@ -33745,7 +33745,7 @@
             <a:tbl>
               <a:tblPr>
                 <a:noFill/>
-                <a:tableStyleId>{F29DAB2E-7A2E-4B30-A63D-A3E22F2B7B69}</a:tableStyleId>
+                <a:tableStyleId>{1F3165FF-8F56-436B-82A2-12001549EA57}</a:tableStyleId>
               </a:tblPr>
               <a:tblGrid>
                 <a:gridCol w="975325"/>
@@ -33973,7 +33973,7 @@
             <a:tbl>
               <a:tblPr>
                 <a:noFill/>
-                <a:tableStyleId>{F29DAB2E-7A2E-4B30-A63D-A3E22F2B7B69}</a:tableStyleId>
+                <a:tableStyleId>{1F3165FF-8F56-436B-82A2-12001549EA57}</a:tableStyleId>
               </a:tblPr>
               <a:tblGrid>
                 <a:gridCol w="419950"/>
@@ -37158,7 +37158,7 @@
             <a:tbl>
               <a:tblPr>
                 <a:noFill/>
-                <a:tableStyleId>{F29DAB2E-7A2E-4B30-A63D-A3E22F2B7B69}</a:tableStyleId>
+                <a:tableStyleId>{1F3165FF-8F56-436B-82A2-12001549EA57}</a:tableStyleId>
               </a:tblPr>
               <a:tblGrid>
                 <a:gridCol w="975325"/>
@@ -37349,7 +37349,7 @@
             <a:tbl>
               <a:tblPr>
                 <a:noFill/>
-                <a:tableStyleId>{F29DAB2E-7A2E-4B30-A63D-A3E22F2B7B69}</a:tableStyleId>
+                <a:tableStyleId>{1F3165FF-8F56-436B-82A2-12001549EA57}</a:tableStyleId>
               </a:tblPr>
               <a:tblGrid>
                 <a:gridCol w="975325"/>
@@ -37777,7 +37777,7 @@
             <a:tbl>
               <a:tblPr>
                 <a:noFill/>
-                <a:tableStyleId>{F29DAB2E-7A2E-4B30-A63D-A3E22F2B7B69}</a:tableStyleId>
+                <a:tableStyleId>{1F3165FF-8F56-436B-82A2-12001549EA57}</a:tableStyleId>
               </a:tblPr>
               <a:tblGrid>
                 <a:gridCol w="419950"/>
@@ -41274,7 +41274,7 @@
             <a:tbl>
               <a:tblPr>
                 <a:noFill/>
-                <a:tableStyleId>{F29DAB2E-7A2E-4B30-A63D-A3E22F2B7B69}</a:tableStyleId>
+                <a:tableStyleId>{1F3165FF-8F56-436B-82A2-12001549EA57}</a:tableStyleId>
               </a:tblPr>
               <a:tblGrid>
                 <a:gridCol w="419950"/>
@@ -41965,7 +41965,7 @@
             <a:tbl>
               <a:tblPr>
                 <a:noFill/>
-                <a:tableStyleId>{F29DAB2E-7A2E-4B30-A63D-A3E22F2B7B69}</a:tableStyleId>
+                <a:tableStyleId>{1F3165FF-8F56-436B-82A2-12001549EA57}</a:tableStyleId>
               </a:tblPr>
               <a:tblGrid>
                 <a:gridCol w="975325"/>
@@ -42156,7 +42156,7 @@
             <a:tbl>
               <a:tblPr>
                 <a:noFill/>
-                <a:tableStyleId>{F29DAB2E-7A2E-4B30-A63D-A3E22F2B7B69}</a:tableStyleId>
+                <a:tableStyleId>{1F3165FF-8F56-436B-82A2-12001549EA57}</a:tableStyleId>
               </a:tblPr>
               <a:tblGrid>
                 <a:gridCol w="975325"/>
@@ -42515,7 +42515,7 @@
             <a:tbl>
               <a:tblPr>
                 <a:noFill/>
-                <a:tableStyleId>{F29DAB2E-7A2E-4B30-A63D-A3E22F2B7B69}</a:tableStyleId>
+                <a:tableStyleId>{1F3165FF-8F56-436B-82A2-12001549EA57}</a:tableStyleId>
               </a:tblPr>
               <a:tblGrid>
                 <a:gridCol w="975325"/>
@@ -45450,7 +45450,7 @@
             <a:tbl>
               <a:tblPr>
                 <a:noFill/>
-                <a:tableStyleId>{F29DAB2E-7A2E-4B30-A63D-A3E22F2B7B69}</a:tableStyleId>
+                <a:tableStyleId>{1F3165FF-8F56-436B-82A2-12001549EA57}</a:tableStyleId>
               </a:tblPr>
               <a:tblGrid>
                 <a:gridCol w="975325"/>
@@ -45641,7 +45641,7 @@
             <a:tbl>
               <a:tblPr>
                 <a:noFill/>
-                <a:tableStyleId>{F29DAB2E-7A2E-4B30-A63D-A3E22F2B7B69}</a:tableStyleId>
+                <a:tableStyleId>{1F3165FF-8F56-436B-82A2-12001549EA57}</a:tableStyleId>
               </a:tblPr>
               <a:tblGrid>
                 <a:gridCol w="975325"/>
@@ -46086,7 +46086,7 @@
             <a:tbl>
               <a:tblPr>
                 <a:noFill/>
-                <a:tableStyleId>{F29DAB2E-7A2E-4B30-A63D-A3E22F2B7B69}</a:tableStyleId>
+                <a:tableStyleId>{1F3165FF-8F56-436B-82A2-12001549EA57}</a:tableStyleId>
               </a:tblPr>
               <a:tblGrid>
                 <a:gridCol w="419950"/>
@@ -49192,7 +49192,7 @@
             <a:tbl>
               <a:tblPr>
                 <a:noFill/>
-                <a:tableStyleId>{F29DAB2E-7A2E-4B30-A63D-A3E22F2B7B69}</a:tableStyleId>
+                <a:tableStyleId>{1F3165FF-8F56-436B-82A2-12001549EA57}</a:tableStyleId>
               </a:tblPr>
               <a:tblGrid>
                 <a:gridCol w="975325"/>
@@ -49445,7 +49445,7 @@
             <a:tbl>
               <a:tblPr>
                 <a:noFill/>
-                <a:tableStyleId>{F29DAB2E-7A2E-4B30-A63D-A3E22F2B7B69}</a:tableStyleId>
+                <a:tableStyleId>{1F3165FF-8F56-436B-82A2-12001549EA57}</a:tableStyleId>
               </a:tblPr>
               <a:tblGrid>
                 <a:gridCol w="419950"/>
@@ -51706,7 +51706,7 @@
             </a:pPr>
             <a:r>
               <a:rPr lang="en"/>
-              <a:t>mySample.txt, /home, 02/01/2021</a:t>
+              <a:t>mySample.txt, /home, 2021/02/01</a:t>
             </a:r>
             <a:endParaRPr/>
           </a:p>
@@ -51722,7 +51722,7 @@
             </a:pPr>
             <a:r>
               <a:rPr lang="en"/>
-              <a:t>mySample1.txt, /root, 02/01/2021</a:t>
+              <a:t>mySample1.txt, /root, 2021/02/01</a:t>
             </a:r>
             <a:endParaRPr/>
           </a:p>
@@ -51738,7 +51738,7 @@
             </a:pPr>
             <a:r>
               <a:rPr lang="en"/>
-              <a:t>mySample2.txt, /user, 02/06/2021</a:t>
+              <a:t>mySample2.txt, /user, 2021/02/06</a:t>
             </a:r>
             <a:endParaRPr/>
           </a:p>
@@ -51978,7 +51978,7 @@
                 <a:cs typeface="Calibri"/>
                 <a:sym typeface="Calibri"/>
               </a:rPr>
-              <a:t>["02/06/2021: {Name: mySample2.txt, Directory: /user, Modified Date: 2021/</a:t>
+              <a:t>["2021/02/06: {Name: mySample2.txt, Directory: /user, Modified Date: 2021/</a:t>
             </a:r>
             <a:r>
               <a:rPr lang="en">
@@ -52022,7 +52022,7 @@
                 <a:cs typeface="Calibri"/>
                 <a:sym typeface="Calibri"/>
               </a:rPr>
-              <a:t>"02/01/2021: {Name: mySample1.txt, Directory: /root, Modified Date: 2021/</a:t>
+              <a:t>"2021/02/01: {Name: mySample1.txt, Directory: /root, Modified Date: 2021/</a:t>
             </a:r>
             <a:r>
               <a:rPr lang="en">
@@ -52066,7 +52066,7 @@
                 <a:cs typeface="Calibri"/>
                 <a:sym typeface="Calibri"/>
               </a:rPr>
-              <a:t>"02/01/2021: {Name: mySample.txt, Directory: /home, Modified Date: 2021/</a:t>
+              <a:t>"2021/02/01: {Name: mySample.txt, Directory: /home, Modified Date: 2021/</a:t>
             </a:r>
             <a:r>
               <a:rPr lang="en">
@@ -53859,9 +53859,9 @@
 </file>
 
 <file path=ppt/theme/theme1.xml><?xml version="1.0" encoding="utf-8"?>
-<a:theme xmlns:a="http://schemas.openxmlformats.org/drawingml/2006/main" xmlns:r="http://schemas.openxmlformats.org/officeDocument/2006/relationships" name="Simple Light">
+<a:theme xmlns:a="http://schemas.openxmlformats.org/drawingml/2006/main" xmlns:r="http://schemas.openxmlformats.org/officeDocument/2006/relationships">
   <a:themeElements>
-    <a:clrScheme name="Simple Light">
+    <a:clrScheme name="Default">
       <a:dk1>
         <a:srgbClr val="000000"/>
       </a:dk1>
@@ -53869,34 +53869,34 @@
         <a:srgbClr val="FFFFFF"/>
       </a:lt1>
       <a:dk2>
-        <a:srgbClr val="595959"/>
+        <a:srgbClr val="158158"/>
       </a:dk2>
       <a:lt2>
-        <a:srgbClr val="EEEEEE"/>
+        <a:srgbClr val="F3F3F3"/>
       </a:lt2>
       <a:accent1>
-        <a:srgbClr val="4285F4"/>
+        <a:srgbClr val="058DC7"/>
       </a:accent1>
       <a:accent2>
-        <a:srgbClr val="212121"/>
+        <a:srgbClr val="50B432"/>
       </a:accent2>
       <a:accent3>
-        <a:srgbClr val="78909C"/>
+        <a:srgbClr val="ED561B"/>
       </a:accent3>
       <a:accent4>
-        <a:srgbClr val="FFAB40"/>
+        <a:srgbClr val="EDEF00"/>
       </a:accent4>
       <a:accent5>
-        <a:srgbClr val="0097A7"/>
+        <a:srgbClr val="24CBE5"/>
       </a:accent5>
       <a:accent6>
-        <a:srgbClr val="EEFF41"/>
+        <a:srgbClr val="64E572"/>
       </a:accent6>
       <a:hlink>
-        <a:srgbClr val="0097A7"/>
+        <a:srgbClr val="2200CC"/>
       </a:hlink>
       <a:folHlink>
-        <a:srgbClr val="0097A7"/>
+        <a:srgbClr val="551A8B"/>
       </a:folHlink>
     </a:clrScheme>
     <a:fontScheme name="Office">
@@ -54138,9 +54138,9 @@
 </file>
 
 <file path=ppt/theme/theme2.xml><?xml version="1.0" encoding="utf-8"?>
-<a:theme xmlns:a="http://schemas.openxmlformats.org/drawingml/2006/main" xmlns:r="http://schemas.openxmlformats.org/officeDocument/2006/relationships">
+<a:theme xmlns:a="http://schemas.openxmlformats.org/drawingml/2006/main" xmlns:r="http://schemas.openxmlformats.org/officeDocument/2006/relationships" name="Simple Light">
   <a:themeElements>
-    <a:clrScheme name="Default">
+    <a:clrScheme name="Simple Light">
       <a:dk1>
         <a:srgbClr val="000000"/>
       </a:dk1>
@@ -54148,34 +54148,34 @@
         <a:srgbClr val="FFFFFF"/>
       </a:lt1>
       <a:dk2>
-        <a:srgbClr val="158158"/>
+        <a:srgbClr val="595959"/>
       </a:dk2>
       <a:lt2>
-        <a:srgbClr val="F3F3F3"/>
+        <a:srgbClr val="EEEEEE"/>
       </a:lt2>
       <a:accent1>
-        <a:srgbClr val="058DC7"/>
+        <a:srgbClr val="4285F4"/>
       </a:accent1>
       <a:accent2>
-        <a:srgbClr val="50B432"/>
+        <a:srgbClr val="212121"/>
       </a:accent2>
       <a:accent3>
-        <a:srgbClr val="ED561B"/>
+        <a:srgbClr val="78909C"/>
       </a:accent3>
       <a:accent4>
-        <a:srgbClr val="EDEF00"/>
+        <a:srgbClr val="FFAB40"/>
       </a:accent4>
       <a:accent5>
-        <a:srgbClr val="24CBE5"/>
+        <a:srgbClr val="0097A7"/>
       </a:accent5>
       <a:accent6>
-        <a:srgbClr val="64E572"/>
+        <a:srgbClr val="EEFF41"/>
       </a:accent6>
       <a:hlink>
-        <a:srgbClr val="2200CC"/>
+        <a:srgbClr val="0097A7"/>
       </a:hlink>
       <a:folHlink>
-        <a:srgbClr val="551A8B"/>
+        <a:srgbClr val="0097A7"/>
       </a:folHlink>
     </a:clrScheme>
     <a:fontScheme name="Office">

</xml_diff>